<commit_message>
adding files in repo
</commit_message>
<xml_diff>
--- a/AWS Learning/AWS Cloud Practitioner Tutorial By Nani.pptx
+++ b/AWS Learning/AWS Cloud Practitioner Tutorial By Nani.pptx
@@ -340,7 +340,7 @@
           <a:p>
             <a:fld id="{1600AA4D-5555-491A-B473-7EB4B3175B37}" type="datetimeFigureOut">
               <a:rPr lang="en-US" smtClean="0"/>
-              <a:t>4/9/2025</a:t>
+              <a:t>4/12/2025</a:t>
             </a:fld>
             <a:endParaRPr lang="en-US"/>
           </a:p>
@@ -538,7 +538,7 @@
           <a:p>
             <a:fld id="{1600AA4D-5555-491A-B473-7EB4B3175B37}" type="datetimeFigureOut">
               <a:rPr lang="en-US" smtClean="0"/>
-              <a:t>4/9/2025</a:t>
+              <a:t>4/12/2025</a:t>
             </a:fld>
             <a:endParaRPr lang="en-US"/>
           </a:p>
@@ -746,7 +746,7 @@
           <a:p>
             <a:fld id="{1600AA4D-5555-491A-B473-7EB4B3175B37}" type="datetimeFigureOut">
               <a:rPr lang="en-US" smtClean="0"/>
-              <a:t>4/9/2025</a:t>
+              <a:t>4/12/2025</a:t>
             </a:fld>
             <a:endParaRPr lang="en-US"/>
           </a:p>
@@ -944,7 +944,7 @@
           <a:p>
             <a:fld id="{1600AA4D-5555-491A-B473-7EB4B3175B37}" type="datetimeFigureOut">
               <a:rPr lang="en-US" smtClean="0"/>
-              <a:t>4/9/2025</a:t>
+              <a:t>4/12/2025</a:t>
             </a:fld>
             <a:endParaRPr lang="en-US"/>
           </a:p>
@@ -1219,7 +1219,7 @@
           <a:p>
             <a:fld id="{1600AA4D-5555-491A-B473-7EB4B3175B37}" type="datetimeFigureOut">
               <a:rPr lang="en-US" smtClean="0"/>
-              <a:t>4/9/2025</a:t>
+              <a:t>4/12/2025</a:t>
             </a:fld>
             <a:endParaRPr lang="en-US"/>
           </a:p>
@@ -1484,7 +1484,7 @@
           <a:p>
             <a:fld id="{1600AA4D-5555-491A-B473-7EB4B3175B37}" type="datetimeFigureOut">
               <a:rPr lang="en-US" smtClean="0"/>
-              <a:t>4/9/2025</a:t>
+              <a:t>4/12/2025</a:t>
             </a:fld>
             <a:endParaRPr lang="en-US"/>
           </a:p>
@@ -1896,7 +1896,7 @@
           <a:p>
             <a:fld id="{1600AA4D-5555-491A-B473-7EB4B3175B37}" type="datetimeFigureOut">
               <a:rPr lang="en-US" smtClean="0"/>
-              <a:t>4/9/2025</a:t>
+              <a:t>4/12/2025</a:t>
             </a:fld>
             <a:endParaRPr lang="en-US"/>
           </a:p>
@@ -2037,7 +2037,7 @@
           <a:p>
             <a:fld id="{1600AA4D-5555-491A-B473-7EB4B3175B37}" type="datetimeFigureOut">
               <a:rPr lang="en-US" smtClean="0"/>
-              <a:t>4/9/2025</a:t>
+              <a:t>4/12/2025</a:t>
             </a:fld>
             <a:endParaRPr lang="en-US"/>
           </a:p>
@@ -2150,7 +2150,7 @@
           <a:p>
             <a:fld id="{1600AA4D-5555-491A-B473-7EB4B3175B37}" type="datetimeFigureOut">
               <a:rPr lang="en-US" smtClean="0"/>
-              <a:t>4/9/2025</a:t>
+              <a:t>4/12/2025</a:t>
             </a:fld>
             <a:endParaRPr lang="en-US"/>
           </a:p>
@@ -2461,7 +2461,7 @@
           <a:p>
             <a:fld id="{1600AA4D-5555-491A-B473-7EB4B3175B37}" type="datetimeFigureOut">
               <a:rPr lang="en-US" smtClean="0"/>
-              <a:t>4/9/2025</a:t>
+              <a:t>4/12/2025</a:t>
             </a:fld>
             <a:endParaRPr lang="en-US"/>
           </a:p>
@@ -2749,7 +2749,7 @@
           <a:p>
             <a:fld id="{1600AA4D-5555-491A-B473-7EB4B3175B37}" type="datetimeFigureOut">
               <a:rPr lang="en-US" smtClean="0"/>
-              <a:t>4/9/2025</a:t>
+              <a:t>4/12/2025</a:t>
             </a:fld>
             <a:endParaRPr lang="en-US"/>
           </a:p>
@@ -2990,7 +2990,7 @@
           <a:p>
             <a:fld id="{1600AA4D-5555-491A-B473-7EB4B3175B37}" type="datetimeFigureOut">
               <a:rPr lang="en-US" smtClean="0"/>
-              <a:t>4/9/2025</a:t>
+              <a:t>4/12/2025</a:t>
             </a:fld>
             <a:endParaRPr lang="en-US"/>
           </a:p>

</xml_diff>